<commit_message>
adding a head slide and creating a pdf version
</commit_message>
<xml_diff>
--- a/the hive bus.pptx
+++ b/the hive bus.pptx
@@ -5,13 +5,14 @@
     <p:sldMasterId id="2147483648" r:id="rId1"/>
   </p:sldMasterIdLst>
   <p:sldIdLst>
-    <p:sldId id="259" r:id="rId2"/>
-    <p:sldId id="266" r:id="rId3"/>
-    <p:sldId id="261" r:id="rId4"/>
-    <p:sldId id="262" r:id="rId5"/>
-    <p:sldId id="267" r:id="rId6"/>
-    <p:sldId id="258" r:id="rId7"/>
-    <p:sldId id="265" r:id="rId8"/>
+    <p:sldId id="268" r:id="rId2"/>
+    <p:sldId id="259" r:id="rId3"/>
+    <p:sldId id="266" r:id="rId4"/>
+    <p:sldId id="261" r:id="rId5"/>
+    <p:sldId id="262" r:id="rId6"/>
+    <p:sldId id="267" r:id="rId7"/>
+    <p:sldId id="258" r:id="rId8"/>
+    <p:sldId id="265" r:id="rId9"/>
   </p:sldIdLst>
   <p:sldSz cx="12192000" cy="6858000"/>
   <p:notesSz cx="6858000" cy="9144000"/>
@@ -276,7 +277,7 @@
           <a:p>
             <a:fld id="{7A35CFBD-BAEC-481C-B25C-B454F6258635}" type="datetimeFigureOut">
               <a:rPr lang="en-US" smtClean="0"/>
-              <a:t>2/1/2022</a:t>
+              <a:t>2/3/2022</a:t>
             </a:fld>
             <a:endParaRPr lang="en-US" dirty="0"/>
           </a:p>
@@ -474,7 +475,7 @@
           <a:p>
             <a:fld id="{7A35CFBD-BAEC-481C-B25C-B454F6258635}" type="datetimeFigureOut">
               <a:rPr lang="en-US" smtClean="0"/>
-              <a:t>2/1/2022</a:t>
+              <a:t>2/3/2022</a:t>
             </a:fld>
             <a:endParaRPr lang="en-US" dirty="0"/>
           </a:p>
@@ -682,7 +683,7 @@
           <a:p>
             <a:fld id="{7A35CFBD-BAEC-481C-B25C-B454F6258635}" type="datetimeFigureOut">
               <a:rPr lang="en-US" smtClean="0"/>
-              <a:t>2/1/2022</a:t>
+              <a:t>2/3/2022</a:t>
             </a:fld>
             <a:endParaRPr lang="en-US" dirty="0"/>
           </a:p>
@@ -880,7 +881,7 @@
           <a:p>
             <a:fld id="{7A35CFBD-BAEC-481C-B25C-B454F6258635}" type="datetimeFigureOut">
               <a:rPr lang="en-US" smtClean="0"/>
-              <a:t>2/1/2022</a:t>
+              <a:t>2/3/2022</a:t>
             </a:fld>
             <a:endParaRPr lang="en-US" dirty="0"/>
           </a:p>
@@ -1155,7 +1156,7 @@
           <a:p>
             <a:fld id="{7A35CFBD-BAEC-481C-B25C-B454F6258635}" type="datetimeFigureOut">
               <a:rPr lang="en-US" smtClean="0"/>
-              <a:t>2/1/2022</a:t>
+              <a:t>2/3/2022</a:t>
             </a:fld>
             <a:endParaRPr lang="en-US" dirty="0"/>
           </a:p>
@@ -1420,7 +1421,7 @@
           <a:p>
             <a:fld id="{7A35CFBD-BAEC-481C-B25C-B454F6258635}" type="datetimeFigureOut">
               <a:rPr lang="en-US" smtClean="0"/>
-              <a:t>2/1/2022</a:t>
+              <a:t>2/3/2022</a:t>
             </a:fld>
             <a:endParaRPr lang="en-US" dirty="0"/>
           </a:p>
@@ -1832,7 +1833,7 @@
           <a:p>
             <a:fld id="{7A35CFBD-BAEC-481C-B25C-B454F6258635}" type="datetimeFigureOut">
               <a:rPr lang="en-US" smtClean="0"/>
-              <a:t>2/1/2022</a:t>
+              <a:t>2/3/2022</a:t>
             </a:fld>
             <a:endParaRPr lang="en-US" dirty="0"/>
           </a:p>
@@ -1973,7 +1974,7 @@
           <a:p>
             <a:fld id="{7A35CFBD-BAEC-481C-B25C-B454F6258635}" type="datetimeFigureOut">
               <a:rPr lang="en-US" smtClean="0"/>
-              <a:t>2/1/2022</a:t>
+              <a:t>2/3/2022</a:t>
             </a:fld>
             <a:endParaRPr lang="en-US" dirty="0"/>
           </a:p>
@@ -2086,7 +2087,7 @@
           <a:p>
             <a:fld id="{7A35CFBD-BAEC-481C-B25C-B454F6258635}" type="datetimeFigureOut">
               <a:rPr lang="en-US" smtClean="0"/>
-              <a:t>2/1/2022</a:t>
+              <a:t>2/3/2022</a:t>
             </a:fld>
             <a:endParaRPr lang="en-US" dirty="0"/>
           </a:p>
@@ -2397,7 +2398,7 @@
           <a:p>
             <a:fld id="{7A35CFBD-BAEC-481C-B25C-B454F6258635}" type="datetimeFigureOut">
               <a:rPr lang="en-US" smtClean="0"/>
-              <a:t>2/1/2022</a:t>
+              <a:t>2/3/2022</a:t>
             </a:fld>
             <a:endParaRPr lang="en-US" dirty="0"/>
           </a:p>
@@ -2685,7 +2686,7 @@
           <a:p>
             <a:fld id="{7A35CFBD-BAEC-481C-B25C-B454F6258635}" type="datetimeFigureOut">
               <a:rPr lang="en-US" smtClean="0"/>
-              <a:t>2/1/2022</a:t>
+              <a:t>2/3/2022</a:t>
             </a:fld>
             <a:endParaRPr lang="en-US" dirty="0"/>
           </a:p>
@@ -2926,7 +2927,7 @@
           <a:p>
             <a:fld id="{7A35CFBD-BAEC-481C-B25C-B454F6258635}" type="datetimeFigureOut">
               <a:rPr lang="en-US" smtClean="0"/>
-              <a:t>2/1/2022</a:t>
+              <a:t>2/3/2022</a:t>
             </a:fld>
             <a:endParaRPr lang="en-US" dirty="0"/>
           </a:p>
@@ -3327,6 +3328,1624 @@
 </file>
 
 <file path=ppt/slides/slide1.xml><?xml version="1.0" encoding="utf-8"?>
+<p:sld xmlns:a="http://schemas.openxmlformats.org/drawingml/2006/main" xmlns:r="http://schemas.openxmlformats.org/officeDocument/2006/relationships" xmlns:p="http://schemas.openxmlformats.org/presentationml/2006/main">
+  <p:cSld>
+    <p:spTree>
+      <p:nvGrpSpPr>
+        <p:cNvPr id="1" name=""/>
+        <p:cNvGrpSpPr/>
+        <p:nvPr/>
+      </p:nvGrpSpPr>
+      <p:grpSpPr>
+        <a:xfrm>
+          <a:off x="0" y="0"/>
+          <a:ext cx="0" cy="0"/>
+          <a:chOff x="0" y="0"/>
+          <a:chExt cx="0" cy="0"/>
+        </a:xfrm>
+      </p:grpSpPr>
+      <p:sp>
+        <p:nvSpPr>
+          <p:cNvPr id="47" name="TextBox 46">
+            <a:extLst>
+              <a:ext uri="{FF2B5EF4-FFF2-40B4-BE49-F238E27FC236}">
+                <a16:creationId xmlns:a16="http://schemas.microsoft.com/office/drawing/2014/main" id="{2AB2E027-84F7-4149-A60E-C4B60567C5BC}"/>
+              </a:ext>
+            </a:extLst>
+          </p:cNvPr>
+          <p:cNvSpPr txBox="1"/>
+          <p:nvPr/>
+        </p:nvSpPr>
+        <p:spPr>
+          <a:xfrm>
+            <a:off x="342389" y="254893"/>
+            <a:ext cx="10985771" cy="646331"/>
+          </a:xfrm>
+          <a:prstGeom prst="rect">
+            <a:avLst/>
+          </a:prstGeom>
+          <a:solidFill>
+            <a:schemeClr val="accent5">
+              <a:lumMod val="50000"/>
+            </a:schemeClr>
+          </a:solidFill>
+        </p:spPr>
+        <p:txBody>
+          <a:bodyPr wrap="square" rtlCol="0">
+            <a:spAutoFit/>
+          </a:bodyPr>
+          <a:lstStyle/>
+          <a:p>
+            <a:pPr algn="ctr"/>
+            <a:r>
+              <a:rPr lang="en-US" sz="3600" dirty="0">
+                <a:solidFill>
+                  <a:schemeClr val="bg1"/>
+                </a:solidFill>
+                <a:latin typeface="Arial" panose="020B0604020202020204" pitchFamily="34" charset="0"/>
+                <a:cs typeface="Arial" panose="020B0604020202020204" pitchFamily="34" charset="0"/>
+              </a:rPr>
+              <a:t>TEAM 53221 – INNOVATION PROJECT</a:t>
+            </a:r>
+          </a:p>
+        </p:txBody>
+      </p:sp>
+      <p:sp>
+        <p:nvSpPr>
+          <p:cNvPr id="2" name="TextBox 1">
+            <a:extLst>
+              <a:ext uri="{FF2B5EF4-FFF2-40B4-BE49-F238E27FC236}">
+                <a16:creationId xmlns:a16="http://schemas.microsoft.com/office/drawing/2014/main" id="{0CEACBF9-ED03-48A6-BCA2-359F396466B6}"/>
+              </a:ext>
+            </a:extLst>
+          </p:cNvPr>
+          <p:cNvSpPr txBox="1"/>
+          <p:nvPr/>
+        </p:nvSpPr>
+        <p:spPr>
+          <a:xfrm>
+            <a:off x="1808095" y="1083915"/>
+            <a:ext cx="8575809" cy="1569660"/>
+          </a:xfrm>
+          <a:prstGeom prst="rect">
+            <a:avLst/>
+          </a:prstGeom>
+          <a:noFill/>
+        </p:spPr>
+        <p:txBody>
+          <a:bodyPr wrap="none" rtlCol="0">
+            <a:spAutoFit/>
+          </a:bodyPr>
+          <a:lstStyle/>
+          <a:p>
+            <a:r>
+              <a:rPr lang="en-US" sz="9600" dirty="0">
+                <a:solidFill>
+                  <a:schemeClr val="accent2"/>
+                </a:solidFill>
+                <a:latin typeface="Cooper Black" panose="0208090404030B020404" pitchFamily="18" charset="0"/>
+              </a:rPr>
+              <a:t>The Hive Bus </a:t>
+            </a:r>
+          </a:p>
+        </p:txBody>
+      </p:sp>
+      <p:grpSp>
+        <p:nvGrpSpPr>
+          <p:cNvPr id="11" name="Group 10">
+            <a:extLst>
+              <a:ext uri="{FF2B5EF4-FFF2-40B4-BE49-F238E27FC236}">
+                <a16:creationId xmlns:a16="http://schemas.microsoft.com/office/drawing/2014/main" id="{FD569776-FA06-4505-A1F8-6E718691FA5E}"/>
+              </a:ext>
+            </a:extLst>
+          </p:cNvPr>
+          <p:cNvGrpSpPr/>
+          <p:nvPr/>
+        </p:nvGrpSpPr>
+        <p:grpSpPr>
+          <a:xfrm>
+            <a:off x="3822969" y="2520558"/>
+            <a:ext cx="3817709" cy="1155402"/>
+            <a:chOff x="1329265" y="3899103"/>
+            <a:chExt cx="8876131" cy="2729204"/>
+          </a:xfrm>
+        </p:grpSpPr>
+        <p:sp>
+          <p:nvSpPr>
+            <p:cNvPr id="14" name="Hexagon 13">
+              <a:extLst>
+                <a:ext uri="{FF2B5EF4-FFF2-40B4-BE49-F238E27FC236}">
+                  <a16:creationId xmlns:a16="http://schemas.microsoft.com/office/drawing/2014/main" id="{56AA0D9E-06C0-4069-9845-7AFA47BA6468}"/>
+                </a:ext>
+              </a:extLst>
+            </p:cNvPr>
+            <p:cNvSpPr/>
+            <p:nvPr/>
+          </p:nvSpPr>
+          <p:spPr>
+            <a:xfrm>
+              <a:off x="1329265" y="4370294"/>
+              <a:ext cx="1007706" cy="909734"/>
+            </a:xfrm>
+            <a:prstGeom prst="hexagon">
+              <a:avLst>
+                <a:gd name="adj" fmla="val 26489"/>
+                <a:gd name="vf" fmla="val 115470"/>
+              </a:avLst>
+            </a:prstGeom>
+          </p:spPr>
+          <p:style>
+            <a:lnRef idx="2">
+              <a:schemeClr val="accent4">
+                <a:shade val="50000"/>
+              </a:schemeClr>
+            </a:lnRef>
+            <a:fillRef idx="1">
+              <a:schemeClr val="accent4"/>
+            </a:fillRef>
+            <a:effectRef idx="0">
+              <a:schemeClr val="accent4"/>
+            </a:effectRef>
+            <a:fontRef idx="minor">
+              <a:schemeClr val="lt1"/>
+            </a:fontRef>
+          </p:style>
+          <p:txBody>
+            <a:bodyPr rtlCol="0" anchor="ctr"/>
+            <a:lstStyle/>
+            <a:p>
+              <a:pPr algn="ctr"/>
+              <a:endParaRPr lang="en-US" dirty="0"/>
+            </a:p>
+          </p:txBody>
+        </p:sp>
+        <p:sp>
+          <p:nvSpPr>
+            <p:cNvPr id="15" name="Hexagon 14">
+              <a:extLst>
+                <a:ext uri="{FF2B5EF4-FFF2-40B4-BE49-F238E27FC236}">
+                  <a16:creationId xmlns:a16="http://schemas.microsoft.com/office/drawing/2014/main" id="{CE3F9D63-71EE-436F-BB91-36F1F49B8D1E}"/>
+                </a:ext>
+              </a:extLst>
+            </p:cNvPr>
+            <p:cNvSpPr/>
+            <p:nvPr/>
+          </p:nvSpPr>
+          <p:spPr>
+            <a:xfrm>
+              <a:off x="2084267" y="5718573"/>
+              <a:ext cx="1007706" cy="909734"/>
+            </a:xfrm>
+            <a:prstGeom prst="hexagon">
+              <a:avLst>
+                <a:gd name="adj" fmla="val 26489"/>
+                <a:gd name="vf" fmla="val 115470"/>
+              </a:avLst>
+            </a:prstGeom>
+          </p:spPr>
+          <p:style>
+            <a:lnRef idx="2">
+              <a:schemeClr val="accent6">
+                <a:shade val="50000"/>
+              </a:schemeClr>
+            </a:lnRef>
+            <a:fillRef idx="1">
+              <a:schemeClr val="accent6"/>
+            </a:fillRef>
+            <a:effectRef idx="0">
+              <a:schemeClr val="accent6"/>
+            </a:effectRef>
+            <a:fontRef idx="minor">
+              <a:schemeClr val="lt1"/>
+            </a:fontRef>
+          </p:style>
+          <p:txBody>
+            <a:bodyPr rtlCol="0" anchor="ctr"/>
+            <a:lstStyle/>
+            <a:p>
+              <a:pPr algn="ctr"/>
+              <a:endParaRPr lang="en-US" dirty="0"/>
+            </a:p>
+          </p:txBody>
+        </p:sp>
+        <p:sp>
+          <p:nvSpPr>
+            <p:cNvPr id="16" name="Hexagon 15">
+              <a:extLst>
+                <a:ext uri="{FF2B5EF4-FFF2-40B4-BE49-F238E27FC236}">
+                  <a16:creationId xmlns:a16="http://schemas.microsoft.com/office/drawing/2014/main" id="{D0B396B8-DC89-4DB0-B5AE-180A2D8243F1}"/>
+                </a:ext>
+              </a:extLst>
+            </p:cNvPr>
+            <p:cNvSpPr/>
+            <p:nvPr/>
+          </p:nvSpPr>
+          <p:spPr>
+            <a:xfrm>
+              <a:off x="1329265" y="5280028"/>
+              <a:ext cx="1007706" cy="909734"/>
+            </a:xfrm>
+            <a:prstGeom prst="hexagon">
+              <a:avLst>
+                <a:gd name="adj" fmla="val 26489"/>
+                <a:gd name="vf" fmla="val 115470"/>
+              </a:avLst>
+            </a:prstGeom>
+          </p:spPr>
+          <p:style>
+            <a:lnRef idx="2">
+              <a:schemeClr val="accent1">
+                <a:shade val="50000"/>
+              </a:schemeClr>
+            </a:lnRef>
+            <a:fillRef idx="1">
+              <a:schemeClr val="accent1"/>
+            </a:fillRef>
+            <a:effectRef idx="0">
+              <a:schemeClr val="accent1"/>
+            </a:effectRef>
+            <a:fontRef idx="minor">
+              <a:schemeClr val="lt1"/>
+            </a:fontRef>
+          </p:style>
+          <p:txBody>
+            <a:bodyPr rtlCol="0" anchor="ctr"/>
+            <a:lstStyle/>
+            <a:p>
+              <a:pPr algn="ctr"/>
+              <a:endParaRPr lang="en-US" dirty="0"/>
+            </a:p>
+          </p:txBody>
+        </p:sp>
+        <p:sp>
+          <p:nvSpPr>
+            <p:cNvPr id="17" name="Hexagon 16">
+              <a:extLst>
+                <a:ext uri="{FF2B5EF4-FFF2-40B4-BE49-F238E27FC236}">
+                  <a16:creationId xmlns:a16="http://schemas.microsoft.com/office/drawing/2014/main" id="{59DCB207-10AC-4EA8-B5AC-BBCD8E3FF1CA}"/>
+                </a:ext>
+              </a:extLst>
+            </p:cNvPr>
+            <p:cNvSpPr/>
+            <p:nvPr/>
+          </p:nvSpPr>
+          <p:spPr>
+            <a:xfrm>
+              <a:off x="2084461" y="4808836"/>
+              <a:ext cx="1007706" cy="909735"/>
+            </a:xfrm>
+            <a:prstGeom prst="hexagon">
+              <a:avLst>
+                <a:gd name="adj" fmla="val 26489"/>
+                <a:gd name="vf" fmla="val 115470"/>
+              </a:avLst>
+            </a:prstGeom>
+          </p:spPr>
+          <p:style>
+            <a:lnRef idx="1">
+              <a:schemeClr val="accent6"/>
+            </a:lnRef>
+            <a:fillRef idx="2">
+              <a:schemeClr val="accent6"/>
+            </a:fillRef>
+            <a:effectRef idx="1">
+              <a:schemeClr val="accent6"/>
+            </a:effectRef>
+            <a:fontRef idx="minor">
+              <a:schemeClr val="dk1"/>
+            </a:fontRef>
+          </p:style>
+          <p:txBody>
+            <a:bodyPr rtlCol="0" anchor="ctr"/>
+            <a:lstStyle/>
+            <a:p>
+              <a:pPr algn="ctr"/>
+              <a:endParaRPr lang="en-US" dirty="0"/>
+            </a:p>
+          </p:txBody>
+        </p:sp>
+        <p:sp>
+          <p:nvSpPr>
+            <p:cNvPr id="18" name="Hexagon 17">
+              <a:extLst>
+                <a:ext uri="{FF2B5EF4-FFF2-40B4-BE49-F238E27FC236}">
+                  <a16:creationId xmlns:a16="http://schemas.microsoft.com/office/drawing/2014/main" id="{C3B8FEF3-2445-47F6-9C6E-5AA2AFE7D61B}"/>
+                </a:ext>
+              </a:extLst>
+            </p:cNvPr>
+            <p:cNvSpPr/>
+            <p:nvPr/>
+          </p:nvSpPr>
+          <p:spPr>
+            <a:xfrm>
+              <a:off x="2844713" y="5263706"/>
+              <a:ext cx="1007706" cy="909734"/>
+            </a:xfrm>
+            <a:prstGeom prst="hexagon">
+              <a:avLst>
+                <a:gd name="adj" fmla="val 26489"/>
+                <a:gd name="vf" fmla="val 115470"/>
+              </a:avLst>
+            </a:prstGeom>
+          </p:spPr>
+          <p:style>
+            <a:lnRef idx="2">
+              <a:schemeClr val="accent3">
+                <a:shade val="50000"/>
+              </a:schemeClr>
+            </a:lnRef>
+            <a:fillRef idx="1">
+              <a:schemeClr val="accent3"/>
+            </a:fillRef>
+            <a:effectRef idx="0">
+              <a:schemeClr val="accent3"/>
+            </a:effectRef>
+            <a:fontRef idx="minor">
+              <a:schemeClr val="lt1"/>
+            </a:fontRef>
+          </p:style>
+          <p:txBody>
+            <a:bodyPr rtlCol="0" anchor="ctr"/>
+            <a:lstStyle/>
+            <a:p>
+              <a:pPr algn="ctr"/>
+              <a:endParaRPr lang="en-US" dirty="0"/>
+            </a:p>
+          </p:txBody>
+        </p:sp>
+        <p:sp>
+          <p:nvSpPr>
+            <p:cNvPr id="19" name="Hexagon 18">
+              <a:extLst>
+                <a:ext uri="{FF2B5EF4-FFF2-40B4-BE49-F238E27FC236}">
+                  <a16:creationId xmlns:a16="http://schemas.microsoft.com/office/drawing/2014/main" id="{5DE9909E-5AF3-4E8F-BAAB-B260F16E9D58}"/>
+                </a:ext>
+              </a:extLst>
+            </p:cNvPr>
+            <p:cNvSpPr/>
+            <p:nvPr/>
+          </p:nvSpPr>
+          <p:spPr>
+            <a:xfrm>
+              <a:off x="2084267" y="3899105"/>
+              <a:ext cx="1007706" cy="909734"/>
+            </a:xfrm>
+            <a:prstGeom prst="hexagon">
+              <a:avLst>
+                <a:gd name="adj" fmla="val 26489"/>
+                <a:gd name="vf" fmla="val 115470"/>
+              </a:avLst>
+            </a:prstGeom>
+          </p:spPr>
+          <p:style>
+            <a:lnRef idx="2">
+              <a:schemeClr val="accent2">
+                <a:shade val="50000"/>
+              </a:schemeClr>
+            </a:lnRef>
+            <a:fillRef idx="1">
+              <a:schemeClr val="accent2"/>
+            </a:fillRef>
+            <a:effectRef idx="0">
+              <a:schemeClr val="accent2"/>
+            </a:effectRef>
+            <a:fontRef idx="minor">
+              <a:schemeClr val="lt1"/>
+            </a:fontRef>
+          </p:style>
+          <p:txBody>
+            <a:bodyPr rtlCol="0" anchor="ctr"/>
+            <a:lstStyle/>
+            <a:p>
+              <a:pPr algn="ctr"/>
+              <a:endParaRPr lang="en-US" dirty="0"/>
+            </a:p>
+          </p:txBody>
+        </p:sp>
+        <p:sp>
+          <p:nvSpPr>
+            <p:cNvPr id="20" name="Hexagon 19">
+              <a:extLst>
+                <a:ext uri="{FF2B5EF4-FFF2-40B4-BE49-F238E27FC236}">
+                  <a16:creationId xmlns:a16="http://schemas.microsoft.com/office/drawing/2014/main" id="{67A39BD4-A35E-4AC8-8436-08444C706E94}"/>
+                </a:ext>
+              </a:extLst>
+            </p:cNvPr>
+            <p:cNvSpPr/>
+            <p:nvPr/>
+          </p:nvSpPr>
+          <p:spPr>
+            <a:xfrm>
+              <a:off x="2844713" y="4353972"/>
+              <a:ext cx="1007706" cy="909734"/>
+            </a:xfrm>
+            <a:prstGeom prst="hexagon">
+              <a:avLst>
+                <a:gd name="adj" fmla="val 26489"/>
+                <a:gd name="vf" fmla="val 115470"/>
+              </a:avLst>
+            </a:prstGeom>
+          </p:spPr>
+          <p:style>
+            <a:lnRef idx="2">
+              <a:schemeClr val="accent1">
+                <a:shade val="50000"/>
+              </a:schemeClr>
+            </a:lnRef>
+            <a:fillRef idx="1">
+              <a:schemeClr val="accent1"/>
+            </a:fillRef>
+            <a:effectRef idx="0">
+              <a:schemeClr val="accent1"/>
+            </a:effectRef>
+            <a:fontRef idx="minor">
+              <a:schemeClr val="lt1"/>
+            </a:fontRef>
+          </p:style>
+          <p:txBody>
+            <a:bodyPr rtlCol="0" anchor="ctr"/>
+            <a:lstStyle/>
+            <a:p>
+              <a:pPr algn="ctr"/>
+              <a:endParaRPr lang="en-US" dirty="0"/>
+            </a:p>
+          </p:txBody>
+        </p:sp>
+        <p:sp>
+          <p:nvSpPr>
+            <p:cNvPr id="21" name="Hexagon 20">
+              <a:extLst>
+                <a:ext uri="{FF2B5EF4-FFF2-40B4-BE49-F238E27FC236}">
+                  <a16:creationId xmlns:a16="http://schemas.microsoft.com/office/drawing/2014/main" id="{EDA1B2A0-DF73-4A28-B895-11BE1BCF881C}"/>
+                </a:ext>
+              </a:extLst>
+            </p:cNvPr>
+            <p:cNvSpPr/>
+            <p:nvPr/>
+          </p:nvSpPr>
+          <p:spPr>
+            <a:xfrm>
+              <a:off x="3621486" y="3899104"/>
+              <a:ext cx="1007706" cy="909734"/>
+            </a:xfrm>
+            <a:prstGeom prst="hexagon">
+              <a:avLst>
+                <a:gd name="adj" fmla="val 26489"/>
+                <a:gd name="vf" fmla="val 115470"/>
+              </a:avLst>
+            </a:prstGeom>
+          </p:spPr>
+          <p:style>
+            <a:lnRef idx="2">
+              <a:schemeClr val="accent4">
+                <a:shade val="50000"/>
+              </a:schemeClr>
+            </a:lnRef>
+            <a:fillRef idx="1">
+              <a:schemeClr val="accent4"/>
+            </a:fillRef>
+            <a:effectRef idx="0">
+              <a:schemeClr val="accent4"/>
+            </a:effectRef>
+            <a:fontRef idx="minor">
+              <a:schemeClr val="lt1"/>
+            </a:fontRef>
+          </p:style>
+          <p:txBody>
+            <a:bodyPr rtlCol="0" anchor="ctr"/>
+            <a:lstStyle/>
+            <a:p>
+              <a:pPr algn="ctr"/>
+              <a:endParaRPr lang="en-US" dirty="0"/>
+            </a:p>
+          </p:txBody>
+        </p:sp>
+        <p:sp>
+          <p:nvSpPr>
+            <p:cNvPr id="22" name="Hexagon 21">
+              <a:extLst>
+                <a:ext uri="{FF2B5EF4-FFF2-40B4-BE49-F238E27FC236}">
+                  <a16:creationId xmlns:a16="http://schemas.microsoft.com/office/drawing/2014/main" id="{AAD237B9-F56E-4507-AA22-EC0CD61ABF3C}"/>
+                </a:ext>
+              </a:extLst>
+            </p:cNvPr>
+            <p:cNvSpPr/>
+            <p:nvPr/>
+          </p:nvSpPr>
+          <p:spPr>
+            <a:xfrm>
+              <a:off x="4368713" y="5287031"/>
+              <a:ext cx="1007706" cy="909734"/>
+            </a:xfrm>
+            <a:prstGeom prst="hexagon">
+              <a:avLst>
+                <a:gd name="adj" fmla="val 26489"/>
+                <a:gd name="vf" fmla="val 115470"/>
+              </a:avLst>
+            </a:prstGeom>
+          </p:spPr>
+          <p:style>
+            <a:lnRef idx="2">
+              <a:schemeClr val="accent6">
+                <a:shade val="50000"/>
+              </a:schemeClr>
+            </a:lnRef>
+            <a:fillRef idx="1">
+              <a:schemeClr val="accent6"/>
+            </a:fillRef>
+            <a:effectRef idx="0">
+              <a:schemeClr val="accent6"/>
+            </a:effectRef>
+            <a:fontRef idx="minor">
+              <a:schemeClr val="lt1"/>
+            </a:fontRef>
+          </p:style>
+          <p:txBody>
+            <a:bodyPr rtlCol="0" anchor="ctr"/>
+            <a:lstStyle/>
+            <a:p>
+              <a:pPr algn="ctr"/>
+              <a:endParaRPr lang="en-US" dirty="0"/>
+            </a:p>
+          </p:txBody>
+        </p:sp>
+        <p:sp>
+          <p:nvSpPr>
+            <p:cNvPr id="23" name="Hexagon 22">
+              <a:extLst>
+                <a:ext uri="{FF2B5EF4-FFF2-40B4-BE49-F238E27FC236}">
+                  <a16:creationId xmlns:a16="http://schemas.microsoft.com/office/drawing/2014/main" id="{37821796-6C80-4568-8188-BD15B695969D}"/>
+                </a:ext>
+              </a:extLst>
+            </p:cNvPr>
+            <p:cNvSpPr/>
+            <p:nvPr/>
+          </p:nvSpPr>
+          <p:spPr>
+            <a:xfrm>
+              <a:off x="3621486" y="4808838"/>
+              <a:ext cx="1007706" cy="909734"/>
+            </a:xfrm>
+            <a:prstGeom prst="hexagon">
+              <a:avLst>
+                <a:gd name="adj" fmla="val 26489"/>
+                <a:gd name="vf" fmla="val 115470"/>
+              </a:avLst>
+            </a:prstGeom>
+          </p:spPr>
+          <p:style>
+            <a:lnRef idx="2">
+              <a:schemeClr val="accent1">
+                <a:shade val="50000"/>
+              </a:schemeClr>
+            </a:lnRef>
+            <a:fillRef idx="1">
+              <a:schemeClr val="accent1"/>
+            </a:fillRef>
+            <a:effectRef idx="0">
+              <a:schemeClr val="accent1"/>
+            </a:effectRef>
+            <a:fontRef idx="minor">
+              <a:schemeClr val="lt1"/>
+            </a:fontRef>
+          </p:style>
+          <p:txBody>
+            <a:bodyPr rtlCol="0" anchor="ctr"/>
+            <a:lstStyle/>
+            <a:p>
+              <a:pPr algn="ctr"/>
+              <a:endParaRPr lang="en-US" dirty="0"/>
+            </a:p>
+          </p:txBody>
+        </p:sp>
+        <p:sp>
+          <p:nvSpPr>
+            <p:cNvPr id="24" name="Hexagon 23">
+              <a:extLst>
+                <a:ext uri="{FF2B5EF4-FFF2-40B4-BE49-F238E27FC236}">
+                  <a16:creationId xmlns:a16="http://schemas.microsoft.com/office/drawing/2014/main" id="{A1D6DF61-56EC-48A7-95B9-6D731F8E9C67}"/>
+                </a:ext>
+              </a:extLst>
+            </p:cNvPr>
+            <p:cNvSpPr/>
+            <p:nvPr/>
+          </p:nvSpPr>
+          <p:spPr>
+            <a:xfrm>
+              <a:off x="4395926" y="4353970"/>
+              <a:ext cx="971939" cy="933061"/>
+            </a:xfrm>
+            <a:prstGeom prst="hexagon">
+              <a:avLst>
+                <a:gd name="adj" fmla="val 26489"/>
+                <a:gd name="vf" fmla="val 115470"/>
+              </a:avLst>
+            </a:prstGeom>
+          </p:spPr>
+          <p:style>
+            <a:lnRef idx="1">
+              <a:schemeClr val="accent6"/>
+            </a:lnRef>
+            <a:fillRef idx="2">
+              <a:schemeClr val="accent6"/>
+            </a:fillRef>
+            <a:effectRef idx="1">
+              <a:schemeClr val="accent6"/>
+            </a:effectRef>
+            <a:fontRef idx="minor">
+              <a:schemeClr val="dk1"/>
+            </a:fontRef>
+          </p:style>
+          <p:txBody>
+            <a:bodyPr rtlCol="0" anchor="ctr"/>
+            <a:lstStyle/>
+            <a:p>
+              <a:pPr algn="ctr"/>
+              <a:endParaRPr lang="en-US" dirty="0"/>
+            </a:p>
+          </p:txBody>
+        </p:sp>
+        <p:sp>
+          <p:nvSpPr>
+            <p:cNvPr id="25" name="Hexagon 24">
+              <a:extLst>
+                <a:ext uri="{FF2B5EF4-FFF2-40B4-BE49-F238E27FC236}">
+                  <a16:creationId xmlns:a16="http://schemas.microsoft.com/office/drawing/2014/main" id="{004E0149-F4EE-4311-BC79-6782DB6D7F69}"/>
+                </a:ext>
+              </a:extLst>
+            </p:cNvPr>
+            <p:cNvSpPr/>
+            <p:nvPr/>
+          </p:nvSpPr>
+          <p:spPr>
+            <a:xfrm>
+              <a:off x="5136932" y="4808838"/>
+              <a:ext cx="1007706" cy="909734"/>
+            </a:xfrm>
+            <a:prstGeom prst="hexagon">
+              <a:avLst>
+                <a:gd name="adj" fmla="val 26489"/>
+                <a:gd name="vf" fmla="val 115470"/>
+              </a:avLst>
+            </a:prstGeom>
+          </p:spPr>
+          <p:style>
+            <a:lnRef idx="2">
+              <a:schemeClr val="accent3">
+                <a:shade val="50000"/>
+              </a:schemeClr>
+            </a:lnRef>
+            <a:fillRef idx="1">
+              <a:schemeClr val="accent3"/>
+            </a:fillRef>
+            <a:effectRef idx="0">
+              <a:schemeClr val="accent3"/>
+            </a:effectRef>
+            <a:fontRef idx="minor">
+              <a:schemeClr val="lt1"/>
+            </a:fontRef>
+          </p:style>
+          <p:txBody>
+            <a:bodyPr rtlCol="0" anchor="ctr"/>
+            <a:lstStyle/>
+            <a:p>
+              <a:pPr algn="ctr"/>
+              <a:endParaRPr lang="en-US" dirty="0"/>
+            </a:p>
+          </p:txBody>
+        </p:sp>
+        <p:sp>
+          <p:nvSpPr>
+            <p:cNvPr id="26" name="Hexagon 25">
+              <a:extLst>
+                <a:ext uri="{FF2B5EF4-FFF2-40B4-BE49-F238E27FC236}">
+                  <a16:creationId xmlns:a16="http://schemas.microsoft.com/office/drawing/2014/main" id="{80EAA40D-6BC9-4741-8076-8B9B49DEF394}"/>
+                </a:ext>
+              </a:extLst>
+            </p:cNvPr>
+            <p:cNvSpPr/>
+            <p:nvPr/>
+          </p:nvSpPr>
+          <p:spPr>
+            <a:xfrm>
+              <a:off x="3621486" y="5718571"/>
+              <a:ext cx="1007706" cy="909734"/>
+            </a:xfrm>
+            <a:prstGeom prst="hexagon">
+              <a:avLst>
+                <a:gd name="adj" fmla="val 26489"/>
+                <a:gd name="vf" fmla="val 115470"/>
+              </a:avLst>
+            </a:prstGeom>
+          </p:spPr>
+          <p:style>
+            <a:lnRef idx="2">
+              <a:schemeClr val="accent2">
+                <a:shade val="50000"/>
+              </a:schemeClr>
+            </a:lnRef>
+            <a:fillRef idx="1">
+              <a:schemeClr val="accent2"/>
+            </a:fillRef>
+            <a:effectRef idx="0">
+              <a:schemeClr val="accent2"/>
+            </a:effectRef>
+            <a:fontRef idx="minor">
+              <a:schemeClr val="lt1"/>
+            </a:fontRef>
+          </p:style>
+          <p:txBody>
+            <a:bodyPr rtlCol="0" anchor="ctr"/>
+            <a:lstStyle/>
+            <a:p>
+              <a:pPr algn="ctr"/>
+              <a:endParaRPr lang="en-US" dirty="0"/>
+            </a:p>
+          </p:txBody>
+        </p:sp>
+        <p:sp>
+          <p:nvSpPr>
+            <p:cNvPr id="27" name="Hexagon 26">
+              <a:extLst>
+                <a:ext uri="{FF2B5EF4-FFF2-40B4-BE49-F238E27FC236}">
+                  <a16:creationId xmlns:a16="http://schemas.microsoft.com/office/drawing/2014/main" id="{53FDB1FC-CC2F-47B1-8235-E951F8C3F2BD}"/>
+                </a:ext>
+              </a:extLst>
+            </p:cNvPr>
+            <p:cNvSpPr/>
+            <p:nvPr/>
+          </p:nvSpPr>
+          <p:spPr>
+            <a:xfrm>
+              <a:off x="5136932" y="3899104"/>
+              <a:ext cx="1007706" cy="909734"/>
+            </a:xfrm>
+            <a:prstGeom prst="hexagon">
+              <a:avLst>
+                <a:gd name="adj" fmla="val 26489"/>
+                <a:gd name="vf" fmla="val 115470"/>
+              </a:avLst>
+            </a:prstGeom>
+          </p:spPr>
+          <p:style>
+            <a:lnRef idx="2">
+              <a:schemeClr val="accent1">
+                <a:shade val="50000"/>
+              </a:schemeClr>
+            </a:lnRef>
+            <a:fillRef idx="1">
+              <a:schemeClr val="accent1"/>
+            </a:fillRef>
+            <a:effectRef idx="0">
+              <a:schemeClr val="accent1"/>
+            </a:effectRef>
+            <a:fontRef idx="minor">
+              <a:schemeClr val="lt1"/>
+            </a:fontRef>
+          </p:style>
+          <p:txBody>
+            <a:bodyPr rtlCol="0" anchor="ctr"/>
+            <a:lstStyle/>
+            <a:p>
+              <a:pPr algn="ctr"/>
+              <a:endParaRPr lang="en-US" dirty="0"/>
+            </a:p>
+          </p:txBody>
+        </p:sp>
+        <p:sp>
+          <p:nvSpPr>
+            <p:cNvPr id="28" name="Hexagon 27">
+              <a:extLst>
+                <a:ext uri="{FF2B5EF4-FFF2-40B4-BE49-F238E27FC236}">
+                  <a16:creationId xmlns:a16="http://schemas.microsoft.com/office/drawing/2014/main" id="{C1AD2C40-AFD5-4EFB-9D17-B1FE097FEF59}"/>
+                </a:ext>
+              </a:extLst>
+            </p:cNvPr>
+            <p:cNvSpPr/>
+            <p:nvPr/>
+          </p:nvSpPr>
+          <p:spPr>
+            <a:xfrm>
+              <a:off x="5913706" y="4353970"/>
+              <a:ext cx="1007706" cy="909734"/>
+            </a:xfrm>
+            <a:prstGeom prst="hexagon">
+              <a:avLst>
+                <a:gd name="adj" fmla="val 26489"/>
+                <a:gd name="vf" fmla="val 115470"/>
+              </a:avLst>
+            </a:prstGeom>
+          </p:spPr>
+          <p:style>
+            <a:lnRef idx="2">
+              <a:schemeClr val="accent4">
+                <a:shade val="50000"/>
+              </a:schemeClr>
+            </a:lnRef>
+            <a:fillRef idx="1">
+              <a:schemeClr val="accent4"/>
+            </a:fillRef>
+            <a:effectRef idx="0">
+              <a:schemeClr val="accent4"/>
+            </a:effectRef>
+            <a:fontRef idx="minor">
+              <a:schemeClr val="lt1"/>
+            </a:fontRef>
+          </p:style>
+          <p:txBody>
+            <a:bodyPr rtlCol="0" anchor="ctr"/>
+            <a:lstStyle/>
+            <a:p>
+              <a:pPr algn="ctr"/>
+              <a:endParaRPr lang="en-US" dirty="0"/>
+            </a:p>
+          </p:txBody>
+        </p:sp>
+        <p:sp>
+          <p:nvSpPr>
+            <p:cNvPr id="29" name="Hexagon 28">
+              <a:extLst>
+                <a:ext uri="{FF2B5EF4-FFF2-40B4-BE49-F238E27FC236}">
+                  <a16:creationId xmlns:a16="http://schemas.microsoft.com/office/drawing/2014/main" id="{F9AA2FAD-2C3E-46A4-B86F-FB31B0FDC052}"/>
+                </a:ext>
+              </a:extLst>
+            </p:cNvPr>
+            <p:cNvSpPr/>
+            <p:nvPr/>
+          </p:nvSpPr>
+          <p:spPr>
+            <a:xfrm>
+              <a:off x="6652380" y="5718571"/>
+              <a:ext cx="1007706" cy="909734"/>
+            </a:xfrm>
+            <a:prstGeom prst="hexagon">
+              <a:avLst>
+                <a:gd name="adj" fmla="val 26489"/>
+                <a:gd name="vf" fmla="val 115470"/>
+              </a:avLst>
+            </a:prstGeom>
+          </p:spPr>
+          <p:style>
+            <a:lnRef idx="2">
+              <a:schemeClr val="accent6">
+                <a:shade val="50000"/>
+              </a:schemeClr>
+            </a:lnRef>
+            <a:fillRef idx="1">
+              <a:schemeClr val="accent6"/>
+            </a:fillRef>
+            <a:effectRef idx="0">
+              <a:schemeClr val="accent6"/>
+            </a:effectRef>
+            <a:fontRef idx="minor">
+              <a:schemeClr val="lt1"/>
+            </a:fontRef>
+          </p:style>
+          <p:txBody>
+            <a:bodyPr rtlCol="0" anchor="ctr"/>
+            <a:lstStyle/>
+            <a:p>
+              <a:pPr algn="ctr"/>
+              <a:endParaRPr lang="en-US" dirty="0"/>
+            </a:p>
+          </p:txBody>
+        </p:sp>
+        <p:sp>
+          <p:nvSpPr>
+            <p:cNvPr id="30" name="Hexagon 29">
+              <a:extLst>
+                <a:ext uri="{FF2B5EF4-FFF2-40B4-BE49-F238E27FC236}">
+                  <a16:creationId xmlns:a16="http://schemas.microsoft.com/office/drawing/2014/main" id="{945CE781-C89C-4D29-B66D-CB07DD7B897C}"/>
+                </a:ext>
+              </a:extLst>
+            </p:cNvPr>
+            <p:cNvSpPr/>
+            <p:nvPr/>
+          </p:nvSpPr>
+          <p:spPr>
+            <a:xfrm>
+              <a:off x="5913706" y="5263704"/>
+              <a:ext cx="1007706" cy="909734"/>
+            </a:xfrm>
+            <a:prstGeom prst="hexagon">
+              <a:avLst>
+                <a:gd name="adj" fmla="val 26489"/>
+                <a:gd name="vf" fmla="val 115470"/>
+              </a:avLst>
+            </a:prstGeom>
+          </p:spPr>
+          <p:style>
+            <a:lnRef idx="2">
+              <a:schemeClr val="accent1">
+                <a:shade val="50000"/>
+              </a:schemeClr>
+            </a:lnRef>
+            <a:fillRef idx="1">
+              <a:schemeClr val="accent1"/>
+            </a:fillRef>
+            <a:effectRef idx="0">
+              <a:schemeClr val="accent1"/>
+            </a:effectRef>
+            <a:fontRef idx="minor">
+              <a:schemeClr val="lt1"/>
+            </a:fontRef>
+          </p:style>
+          <p:txBody>
+            <a:bodyPr rtlCol="0" anchor="ctr"/>
+            <a:lstStyle/>
+            <a:p>
+              <a:pPr algn="ctr"/>
+              <a:endParaRPr lang="en-US" dirty="0"/>
+            </a:p>
+          </p:txBody>
+        </p:sp>
+        <p:sp>
+          <p:nvSpPr>
+            <p:cNvPr id="31" name="Hexagon 30">
+              <a:extLst>
+                <a:ext uri="{FF2B5EF4-FFF2-40B4-BE49-F238E27FC236}">
+                  <a16:creationId xmlns:a16="http://schemas.microsoft.com/office/drawing/2014/main" id="{E7192187-8321-41A7-8504-08C01A781921}"/>
+                </a:ext>
+              </a:extLst>
+            </p:cNvPr>
+            <p:cNvSpPr/>
+            <p:nvPr/>
+          </p:nvSpPr>
+          <p:spPr>
+            <a:xfrm>
+              <a:off x="6688146" y="4808836"/>
+              <a:ext cx="971939" cy="933061"/>
+            </a:xfrm>
+            <a:prstGeom prst="hexagon">
+              <a:avLst>
+                <a:gd name="adj" fmla="val 26489"/>
+                <a:gd name="vf" fmla="val 115470"/>
+              </a:avLst>
+            </a:prstGeom>
+          </p:spPr>
+          <p:style>
+            <a:lnRef idx="1">
+              <a:schemeClr val="accent6"/>
+            </a:lnRef>
+            <a:fillRef idx="2">
+              <a:schemeClr val="accent6"/>
+            </a:fillRef>
+            <a:effectRef idx="1">
+              <a:schemeClr val="accent6"/>
+            </a:effectRef>
+            <a:fontRef idx="minor">
+              <a:schemeClr val="dk1"/>
+            </a:fontRef>
+          </p:style>
+          <p:txBody>
+            <a:bodyPr rtlCol="0" anchor="ctr"/>
+            <a:lstStyle/>
+            <a:p>
+              <a:pPr algn="ctr"/>
+              <a:endParaRPr lang="en-US" dirty="0"/>
+            </a:p>
+          </p:txBody>
+        </p:sp>
+        <p:sp>
+          <p:nvSpPr>
+            <p:cNvPr id="32" name="Hexagon 31">
+              <a:extLst>
+                <a:ext uri="{FF2B5EF4-FFF2-40B4-BE49-F238E27FC236}">
+                  <a16:creationId xmlns:a16="http://schemas.microsoft.com/office/drawing/2014/main" id="{685B4BB6-966D-41F4-B4AD-8A2552B05423}"/>
+                </a:ext>
+              </a:extLst>
+            </p:cNvPr>
+            <p:cNvSpPr/>
+            <p:nvPr/>
+          </p:nvSpPr>
+          <p:spPr>
+            <a:xfrm>
+              <a:off x="6652380" y="3899103"/>
+              <a:ext cx="1007706" cy="909734"/>
+            </a:xfrm>
+            <a:prstGeom prst="hexagon">
+              <a:avLst>
+                <a:gd name="adj" fmla="val 26489"/>
+                <a:gd name="vf" fmla="val 115470"/>
+              </a:avLst>
+            </a:prstGeom>
+          </p:spPr>
+          <p:style>
+            <a:lnRef idx="2">
+              <a:schemeClr val="accent2">
+                <a:shade val="50000"/>
+              </a:schemeClr>
+            </a:lnRef>
+            <a:fillRef idx="1">
+              <a:schemeClr val="accent2"/>
+            </a:fillRef>
+            <a:effectRef idx="0">
+              <a:schemeClr val="accent2"/>
+            </a:effectRef>
+            <a:fontRef idx="minor">
+              <a:schemeClr val="lt1"/>
+            </a:fontRef>
+          </p:style>
+          <p:txBody>
+            <a:bodyPr rtlCol="0" anchor="ctr"/>
+            <a:lstStyle/>
+            <a:p>
+              <a:pPr algn="ctr"/>
+              <a:endParaRPr lang="en-US" dirty="0"/>
+            </a:p>
+          </p:txBody>
+        </p:sp>
+        <p:sp>
+          <p:nvSpPr>
+            <p:cNvPr id="33" name="Hexagon 32">
+              <a:extLst>
+                <a:ext uri="{FF2B5EF4-FFF2-40B4-BE49-F238E27FC236}">
+                  <a16:creationId xmlns:a16="http://schemas.microsoft.com/office/drawing/2014/main" id="{66397F50-1525-4D46-8E30-5FAF2FACB2DE}"/>
+                </a:ext>
+              </a:extLst>
+            </p:cNvPr>
+            <p:cNvSpPr/>
+            <p:nvPr/>
+          </p:nvSpPr>
+          <p:spPr>
+            <a:xfrm>
+              <a:off x="7391053" y="4353969"/>
+              <a:ext cx="1007706" cy="909734"/>
+            </a:xfrm>
+            <a:prstGeom prst="hexagon">
+              <a:avLst>
+                <a:gd name="adj" fmla="val 26489"/>
+                <a:gd name="vf" fmla="val 115470"/>
+              </a:avLst>
+            </a:prstGeom>
+          </p:spPr>
+          <p:style>
+            <a:lnRef idx="2">
+              <a:schemeClr val="accent4">
+                <a:shade val="50000"/>
+              </a:schemeClr>
+            </a:lnRef>
+            <a:fillRef idx="1">
+              <a:schemeClr val="accent4"/>
+            </a:fillRef>
+            <a:effectRef idx="0">
+              <a:schemeClr val="accent4"/>
+            </a:effectRef>
+            <a:fontRef idx="minor">
+              <a:schemeClr val="lt1"/>
+            </a:fontRef>
+          </p:style>
+          <p:txBody>
+            <a:bodyPr rtlCol="0" anchor="ctr"/>
+            <a:lstStyle/>
+            <a:p>
+              <a:pPr algn="ctr"/>
+              <a:endParaRPr lang="en-US" dirty="0"/>
+            </a:p>
+          </p:txBody>
+        </p:sp>
+        <p:sp>
+          <p:nvSpPr>
+            <p:cNvPr id="34" name="Hexagon 33">
+              <a:extLst>
+                <a:ext uri="{FF2B5EF4-FFF2-40B4-BE49-F238E27FC236}">
+                  <a16:creationId xmlns:a16="http://schemas.microsoft.com/office/drawing/2014/main" id="{D06A6FA8-A54A-4FA3-A053-F3AB12855C6F}"/>
+                </a:ext>
+              </a:extLst>
+            </p:cNvPr>
+            <p:cNvSpPr/>
+            <p:nvPr/>
+          </p:nvSpPr>
+          <p:spPr>
+            <a:xfrm>
+              <a:off x="7391053" y="5263703"/>
+              <a:ext cx="1007706" cy="909734"/>
+            </a:xfrm>
+            <a:prstGeom prst="hexagon">
+              <a:avLst>
+                <a:gd name="adj" fmla="val 26489"/>
+                <a:gd name="vf" fmla="val 115470"/>
+              </a:avLst>
+            </a:prstGeom>
+          </p:spPr>
+          <p:style>
+            <a:lnRef idx="2">
+              <a:schemeClr val="accent1">
+                <a:shade val="50000"/>
+              </a:schemeClr>
+            </a:lnRef>
+            <a:fillRef idx="1">
+              <a:schemeClr val="accent1"/>
+            </a:fillRef>
+            <a:effectRef idx="0">
+              <a:schemeClr val="accent1"/>
+            </a:effectRef>
+            <a:fontRef idx="minor">
+              <a:schemeClr val="lt1"/>
+            </a:fontRef>
+          </p:style>
+          <p:txBody>
+            <a:bodyPr rtlCol="0" anchor="ctr"/>
+            <a:lstStyle/>
+            <a:p>
+              <a:pPr algn="ctr"/>
+              <a:endParaRPr lang="en-US" dirty="0"/>
+            </a:p>
+          </p:txBody>
+        </p:sp>
+        <p:sp>
+          <p:nvSpPr>
+            <p:cNvPr id="35" name="Hexagon 34">
+              <a:extLst>
+                <a:ext uri="{FF2B5EF4-FFF2-40B4-BE49-F238E27FC236}">
+                  <a16:creationId xmlns:a16="http://schemas.microsoft.com/office/drawing/2014/main" id="{D4D8BC00-91FD-4349-8398-5DEC78C932BC}"/>
+                </a:ext>
+              </a:extLst>
+            </p:cNvPr>
+            <p:cNvSpPr/>
+            <p:nvPr/>
+          </p:nvSpPr>
+          <p:spPr>
+            <a:xfrm>
+              <a:off x="5135767" y="5718570"/>
+              <a:ext cx="1007706" cy="909734"/>
+            </a:xfrm>
+            <a:prstGeom prst="hexagon">
+              <a:avLst>
+                <a:gd name="adj" fmla="val 26489"/>
+                <a:gd name="vf" fmla="val 115470"/>
+              </a:avLst>
+            </a:prstGeom>
+          </p:spPr>
+          <p:style>
+            <a:lnRef idx="2">
+              <a:schemeClr val="accent4">
+                <a:shade val="50000"/>
+              </a:schemeClr>
+            </a:lnRef>
+            <a:fillRef idx="1">
+              <a:schemeClr val="accent4"/>
+            </a:fillRef>
+            <a:effectRef idx="0">
+              <a:schemeClr val="accent4"/>
+            </a:effectRef>
+            <a:fontRef idx="minor">
+              <a:schemeClr val="lt1"/>
+            </a:fontRef>
+          </p:style>
+          <p:txBody>
+            <a:bodyPr rtlCol="0" anchor="ctr"/>
+            <a:lstStyle/>
+            <a:p>
+              <a:pPr algn="ctr"/>
+              <a:endParaRPr lang="en-US" dirty="0"/>
+            </a:p>
+          </p:txBody>
+        </p:sp>
+        <p:grpSp>
+          <p:nvGrpSpPr>
+            <p:cNvPr id="36" name="Group 35">
+              <a:extLst>
+                <a:ext uri="{FF2B5EF4-FFF2-40B4-BE49-F238E27FC236}">
+                  <a16:creationId xmlns:a16="http://schemas.microsoft.com/office/drawing/2014/main" id="{C2F7DD99-E9A2-4DB2-B670-039A737AC22D}"/>
+                </a:ext>
+              </a:extLst>
+            </p:cNvPr>
+            <p:cNvGrpSpPr/>
+            <p:nvPr/>
+          </p:nvGrpSpPr>
+          <p:grpSpPr>
+            <a:xfrm>
+              <a:off x="7695851" y="3899103"/>
+              <a:ext cx="2509545" cy="2729200"/>
+              <a:chOff x="8625373" y="1304731"/>
+              <a:chExt cx="2509545" cy="2729200"/>
+            </a:xfrm>
+          </p:grpSpPr>
+          <p:grpSp>
+            <p:nvGrpSpPr>
+              <p:cNvPr id="38" name="Group 37">
+                <a:extLst>
+                  <a:ext uri="{FF2B5EF4-FFF2-40B4-BE49-F238E27FC236}">
+                    <a16:creationId xmlns:a16="http://schemas.microsoft.com/office/drawing/2014/main" id="{D7818D21-5781-4E63-A2D0-AE5B6B016FE5}"/>
+                  </a:ext>
+                </a:extLst>
+              </p:cNvPr>
+              <p:cNvGrpSpPr/>
+              <p:nvPr/>
+            </p:nvGrpSpPr>
+            <p:grpSpPr>
+              <a:xfrm>
+                <a:off x="9086855" y="1304731"/>
+                <a:ext cx="1008480" cy="2729200"/>
+                <a:chOff x="9086855" y="1304731"/>
+                <a:chExt cx="1008480" cy="2729200"/>
+              </a:xfrm>
+            </p:grpSpPr>
+            <p:sp>
+              <p:nvSpPr>
+                <p:cNvPr id="40" name="Hexagon 39">
+                  <a:extLst>
+                    <a:ext uri="{FF2B5EF4-FFF2-40B4-BE49-F238E27FC236}">
+                      <a16:creationId xmlns:a16="http://schemas.microsoft.com/office/drawing/2014/main" id="{BDFED4AF-1D95-45E8-B542-640BBD4AD27C}"/>
+                    </a:ext>
+                  </a:extLst>
+                </p:cNvPr>
+                <p:cNvSpPr/>
+                <p:nvPr/>
+              </p:nvSpPr>
+              <p:spPr>
+                <a:xfrm>
+                  <a:off x="9087242" y="2214465"/>
+                  <a:ext cx="1007706" cy="909734"/>
+                </a:xfrm>
+                <a:prstGeom prst="hexagon">
+                  <a:avLst>
+                    <a:gd name="adj" fmla="val 26489"/>
+                    <a:gd name="vf" fmla="val 115470"/>
+                  </a:avLst>
+                </a:prstGeom>
+                <a:solidFill>
+                  <a:srgbClr val="FF0000"/>
+                </a:solidFill>
+                <a:ln>
+                  <a:noFill/>
+                </a:ln>
+              </p:spPr>
+              <p:style>
+                <a:lnRef idx="2">
+                  <a:schemeClr val="accent3">
+                    <a:shade val="50000"/>
+                  </a:schemeClr>
+                </a:lnRef>
+                <a:fillRef idx="1">
+                  <a:schemeClr val="accent3"/>
+                </a:fillRef>
+                <a:effectRef idx="0">
+                  <a:schemeClr val="accent3"/>
+                </a:effectRef>
+                <a:fontRef idx="minor">
+                  <a:schemeClr val="lt1"/>
+                </a:fontRef>
+              </p:style>
+              <p:txBody>
+                <a:bodyPr rtlCol="0" anchor="ctr"/>
+                <a:lstStyle/>
+                <a:p>
+                  <a:pPr algn="ctr"/>
+                  <a:endParaRPr lang="en-US" dirty="0"/>
+                </a:p>
+              </p:txBody>
+            </p:sp>
+            <p:sp>
+              <p:nvSpPr>
+                <p:cNvPr id="41" name="Hexagon 40">
+                  <a:extLst>
+                    <a:ext uri="{FF2B5EF4-FFF2-40B4-BE49-F238E27FC236}">
+                      <a16:creationId xmlns:a16="http://schemas.microsoft.com/office/drawing/2014/main" id="{E45B04C9-136C-46D2-860C-76563EDD183B}"/>
+                    </a:ext>
+                  </a:extLst>
+                </p:cNvPr>
+                <p:cNvSpPr/>
+                <p:nvPr/>
+              </p:nvSpPr>
+              <p:spPr>
+                <a:xfrm>
+                  <a:off x="9086855" y="1304731"/>
+                  <a:ext cx="1007706" cy="909734"/>
+                </a:xfrm>
+                <a:prstGeom prst="hexagon">
+                  <a:avLst>
+                    <a:gd name="adj" fmla="val 26489"/>
+                    <a:gd name="vf" fmla="val 115470"/>
+                  </a:avLst>
+                </a:prstGeom>
+                <a:solidFill>
+                  <a:srgbClr val="FF0000"/>
+                </a:solidFill>
+                <a:ln>
+                  <a:noFill/>
+                </a:ln>
+              </p:spPr>
+              <p:style>
+                <a:lnRef idx="2">
+                  <a:schemeClr val="accent1">
+                    <a:shade val="50000"/>
+                  </a:schemeClr>
+                </a:lnRef>
+                <a:fillRef idx="1">
+                  <a:schemeClr val="accent1"/>
+                </a:fillRef>
+                <a:effectRef idx="0">
+                  <a:schemeClr val="accent1"/>
+                </a:effectRef>
+                <a:fontRef idx="minor">
+                  <a:schemeClr val="lt1"/>
+                </a:fontRef>
+              </p:style>
+              <p:txBody>
+                <a:bodyPr rtlCol="0" anchor="ctr"/>
+                <a:lstStyle/>
+                <a:p>
+                  <a:pPr algn="ctr"/>
+                  <a:endParaRPr lang="en-US" dirty="0"/>
+                </a:p>
+              </p:txBody>
+            </p:sp>
+            <p:sp>
+              <p:nvSpPr>
+                <p:cNvPr id="42" name="Hexagon 41">
+                  <a:extLst>
+                    <a:ext uri="{FF2B5EF4-FFF2-40B4-BE49-F238E27FC236}">
+                      <a16:creationId xmlns:a16="http://schemas.microsoft.com/office/drawing/2014/main" id="{D71B237C-3DD5-4E46-9519-3A8C6D3C0974}"/>
+                    </a:ext>
+                  </a:extLst>
+                </p:cNvPr>
+                <p:cNvSpPr/>
+                <p:nvPr/>
+              </p:nvSpPr>
+              <p:spPr>
+                <a:xfrm>
+                  <a:off x="9087629" y="3124197"/>
+                  <a:ext cx="1007706" cy="909734"/>
+                </a:xfrm>
+                <a:prstGeom prst="hexagon">
+                  <a:avLst>
+                    <a:gd name="adj" fmla="val 26489"/>
+                    <a:gd name="vf" fmla="val 115470"/>
+                  </a:avLst>
+                </a:prstGeom>
+                <a:solidFill>
+                  <a:srgbClr val="FF0000"/>
+                </a:solidFill>
+                <a:ln>
+                  <a:noFill/>
+                </a:ln>
+              </p:spPr>
+              <p:style>
+                <a:lnRef idx="2">
+                  <a:schemeClr val="accent4">
+                    <a:shade val="50000"/>
+                  </a:schemeClr>
+                </a:lnRef>
+                <a:fillRef idx="1">
+                  <a:schemeClr val="accent4"/>
+                </a:fillRef>
+                <a:effectRef idx="0">
+                  <a:schemeClr val="accent4"/>
+                </a:effectRef>
+                <a:fontRef idx="minor">
+                  <a:schemeClr val="lt1"/>
+                </a:fontRef>
+              </p:style>
+              <p:txBody>
+                <a:bodyPr rtlCol="0" anchor="ctr"/>
+                <a:lstStyle/>
+                <a:p>
+                  <a:pPr algn="ctr"/>
+                  <a:endParaRPr lang="en-US" dirty="0"/>
+                </a:p>
+              </p:txBody>
+            </p:sp>
+          </p:grpSp>
+          <p:sp>
+            <p:nvSpPr>
+              <p:cNvPr id="39" name="Arc 38">
+                <a:extLst>
+                  <a:ext uri="{FF2B5EF4-FFF2-40B4-BE49-F238E27FC236}">
+                    <a16:creationId xmlns:a16="http://schemas.microsoft.com/office/drawing/2014/main" id="{AC563135-705A-4D02-8EE3-C2D268DBDFFC}"/>
+                  </a:ext>
+                </a:extLst>
+              </p:cNvPr>
+              <p:cNvSpPr/>
+              <p:nvPr/>
+            </p:nvSpPr>
+            <p:spPr>
+              <a:xfrm>
+                <a:off x="8625373" y="1304731"/>
+                <a:ext cx="2509545" cy="2729200"/>
+              </a:xfrm>
+              <a:prstGeom prst="arc">
+                <a:avLst>
+                  <a:gd name="adj1" fmla="val 16056241"/>
+                  <a:gd name="adj2" fmla="val 5457289"/>
+                </a:avLst>
+              </a:prstGeom>
+              <a:solidFill>
+                <a:srgbClr val="FF0000"/>
+              </a:solidFill>
+            </p:spPr>
+            <p:style>
+              <a:lnRef idx="1">
+                <a:schemeClr val="accent1"/>
+              </a:lnRef>
+              <a:fillRef idx="0">
+                <a:schemeClr val="accent1"/>
+              </a:fillRef>
+              <a:effectRef idx="0">
+                <a:schemeClr val="accent1"/>
+              </a:effectRef>
+              <a:fontRef idx="minor">
+                <a:schemeClr val="tx1"/>
+              </a:fontRef>
+            </p:style>
+            <p:txBody>
+              <a:bodyPr rtlCol="0" anchor="ctr"/>
+              <a:lstStyle/>
+              <a:p>
+                <a:pPr algn="ctr"/>
+                <a:endParaRPr lang="en-US" dirty="0"/>
+              </a:p>
+            </p:txBody>
+          </p:sp>
+        </p:grpSp>
+        <p:sp>
+          <p:nvSpPr>
+            <p:cNvPr id="37" name="Trapezoid 36">
+              <a:extLst>
+                <a:ext uri="{FF2B5EF4-FFF2-40B4-BE49-F238E27FC236}">
+                  <a16:creationId xmlns:a16="http://schemas.microsoft.com/office/drawing/2014/main" id="{717B43D6-ECB3-472B-89C0-1303A1F43482}"/>
+                </a:ext>
+              </a:extLst>
+            </p:cNvPr>
+            <p:cNvSpPr/>
+            <p:nvPr/>
+          </p:nvSpPr>
+          <p:spPr>
+            <a:xfrm rot="5400000">
+              <a:off x="8186912" y="5012179"/>
+              <a:ext cx="2516936" cy="454065"/>
+            </a:xfrm>
+            <a:prstGeom prst="trapezoid">
+              <a:avLst>
+                <a:gd name="adj" fmla="val 43245"/>
+              </a:avLst>
+            </a:prstGeom>
+          </p:spPr>
+          <p:style>
+            <a:lnRef idx="2">
+              <a:schemeClr val="accent1">
+                <a:shade val="50000"/>
+              </a:schemeClr>
+            </a:lnRef>
+            <a:fillRef idx="1">
+              <a:schemeClr val="accent1"/>
+            </a:fillRef>
+            <a:effectRef idx="0">
+              <a:schemeClr val="accent1"/>
+            </a:effectRef>
+            <a:fontRef idx="minor">
+              <a:schemeClr val="lt1"/>
+            </a:fontRef>
+          </p:style>
+          <p:txBody>
+            <a:bodyPr rtlCol="0" anchor="ctr"/>
+            <a:lstStyle/>
+            <a:p>
+              <a:pPr algn="ctr"/>
+              <a:endParaRPr lang="en-US" dirty="0"/>
+            </a:p>
+          </p:txBody>
+        </p:sp>
+      </p:grpSp>
+      <p:grpSp>
+        <p:nvGrpSpPr>
+          <p:cNvPr id="5" name="Group 4">
+            <a:extLst>
+              <a:ext uri="{FF2B5EF4-FFF2-40B4-BE49-F238E27FC236}">
+                <a16:creationId xmlns:a16="http://schemas.microsoft.com/office/drawing/2014/main" id="{E0A3FF4B-3B5A-4AE5-BE88-BE6F20071268}"/>
+              </a:ext>
+            </a:extLst>
+          </p:cNvPr>
+          <p:cNvGrpSpPr/>
+          <p:nvPr/>
+        </p:nvGrpSpPr>
+        <p:grpSpPr>
+          <a:xfrm>
+            <a:off x="4605549" y="4529948"/>
+            <a:ext cx="2459453" cy="2049545"/>
+            <a:chOff x="4605549" y="4529948"/>
+            <a:chExt cx="2459453" cy="2049545"/>
+          </a:xfrm>
+        </p:grpSpPr>
+        <p:pic>
+          <p:nvPicPr>
+            <p:cNvPr id="1026" name="Picture 2" descr="16 Robot Arm Robotic Arm Engineering Sphere Stock Photos, Pictures &amp;amp;  Royalty-Free Images - iStock">
+              <a:extLst>
+                <a:ext uri="{FF2B5EF4-FFF2-40B4-BE49-F238E27FC236}">
+                  <a16:creationId xmlns:a16="http://schemas.microsoft.com/office/drawing/2014/main" id="{C82D3C22-E614-4D90-ADAD-C1FCBD4C270A}"/>
+                </a:ext>
+              </a:extLst>
+            </p:cNvPr>
+            <p:cNvPicPr>
+              <a:picLocks noChangeAspect="1" noChangeArrowheads="1"/>
+            </p:cNvPicPr>
+            <p:nvPr/>
+          </p:nvPicPr>
+          <p:blipFill>
+            <a:blip r:embed="rId2">
+              <a:extLst>
+                <a:ext uri="{28A0092B-C50C-407E-A947-70E740481C1C}">
+                  <a14:useLocalDpi xmlns:a14="http://schemas.microsoft.com/office/drawing/2010/main" val="0"/>
+                </a:ext>
+              </a:extLst>
+            </a:blip>
+            <a:srcRect/>
+            <a:stretch>
+              <a:fillRect/>
+            </a:stretch>
+          </p:blipFill>
+          <p:spPr bwMode="auto">
+            <a:xfrm>
+              <a:off x="4605549" y="4529948"/>
+              <a:ext cx="2459453" cy="2049545"/>
+            </a:xfrm>
+            <a:prstGeom prst="rect">
+              <a:avLst/>
+            </a:prstGeom>
+            <a:noFill/>
+            <a:extLst>
+              <a:ext uri="{909E8E84-426E-40DD-AFC4-6F175D3DCCD1}">
+                <a14:hiddenFill xmlns:a14="http://schemas.microsoft.com/office/drawing/2010/main">
+                  <a:solidFill>
+                    <a:srgbClr val="FFFFFF"/>
+                  </a:solidFill>
+                </a14:hiddenFill>
+              </a:ext>
+            </a:extLst>
+          </p:spPr>
+        </p:pic>
+        <p:pic>
+          <p:nvPicPr>
+            <p:cNvPr id="4" name="Picture 3" descr="Logo&#10;&#10;Description automatically generated">
+              <a:extLst>
+                <a:ext uri="{FF2B5EF4-FFF2-40B4-BE49-F238E27FC236}">
+                  <a16:creationId xmlns:a16="http://schemas.microsoft.com/office/drawing/2014/main" id="{40F08507-C707-487F-8DE9-528561FDEA93}"/>
+                </a:ext>
+              </a:extLst>
+            </p:cNvPr>
+            <p:cNvPicPr>
+              <a:picLocks noChangeAspect="1"/>
+            </p:cNvPicPr>
+            <p:nvPr/>
+          </p:nvPicPr>
+          <p:blipFill>
+            <a:blip r:embed="rId3">
+              <a:extLst>
+                <a:ext uri="{28A0092B-C50C-407E-A947-70E740481C1C}">
+                  <a14:useLocalDpi xmlns:a14="http://schemas.microsoft.com/office/drawing/2010/main" val="0"/>
+                </a:ext>
+              </a:extLst>
+            </a:blip>
+            <a:stretch>
+              <a:fillRect/>
+            </a:stretch>
+          </p:blipFill>
+          <p:spPr>
+            <a:xfrm>
+              <a:off x="5168955" y="4617644"/>
+              <a:ext cx="1383985" cy="1383985"/>
+            </a:xfrm>
+            <a:prstGeom prst="rect">
+              <a:avLst/>
+            </a:prstGeom>
+          </p:spPr>
+        </p:pic>
+      </p:grpSp>
+    </p:spTree>
+    <p:extLst>
+      <p:ext uri="{BB962C8B-B14F-4D97-AF65-F5344CB8AC3E}">
+        <p14:creationId xmlns:p14="http://schemas.microsoft.com/office/powerpoint/2010/main" val="179463278"/>
+      </p:ext>
+    </p:extLst>
+  </p:cSld>
+  <p:clrMapOvr>
+    <a:masterClrMapping/>
+  </p:clrMapOvr>
+</p:sld>
+</file>
+
+<file path=ppt/slides/slide2.xml><?xml version="1.0" encoding="utf-8"?>
 <p:sld xmlns:a="http://schemas.openxmlformats.org/drawingml/2006/main" xmlns:r="http://schemas.openxmlformats.org/officeDocument/2006/relationships" xmlns:p="http://schemas.openxmlformats.org/presentationml/2006/main">
   <p:cSld>
     <p:bg>
@@ -3736,7 +5355,7 @@
 </p:sld>
 </file>
 
-<file path=ppt/slides/slide2.xml><?xml version="1.0" encoding="utf-8"?>
+<file path=ppt/slides/slide3.xml><?xml version="1.0" encoding="utf-8"?>
 <p:sld xmlns:a="http://schemas.openxmlformats.org/drawingml/2006/main" xmlns:r="http://schemas.openxmlformats.org/officeDocument/2006/relationships" xmlns:p="http://schemas.openxmlformats.org/presentationml/2006/main">
   <p:cSld>
     <p:bg>
@@ -6123,7 +7742,7 @@
 </p:sld>
 </file>
 
-<file path=ppt/slides/slide3.xml><?xml version="1.0" encoding="utf-8"?>
+<file path=ppt/slides/slide4.xml><?xml version="1.0" encoding="utf-8"?>
 <p:sld xmlns:a="http://schemas.openxmlformats.org/drawingml/2006/main" xmlns:r="http://schemas.openxmlformats.org/officeDocument/2006/relationships" xmlns:p="http://schemas.openxmlformats.org/presentationml/2006/main">
   <p:cSld>
     <p:spTree>
@@ -8485,7 +10104,7 @@
 </p:sld>
 </file>
 
-<file path=ppt/slides/slide4.xml><?xml version="1.0" encoding="utf-8"?>
+<file path=ppt/slides/slide5.xml><?xml version="1.0" encoding="utf-8"?>
 <p:sld xmlns:a="http://schemas.openxmlformats.org/drawingml/2006/main" xmlns:r="http://schemas.openxmlformats.org/officeDocument/2006/relationships" xmlns:p="http://schemas.openxmlformats.org/presentationml/2006/main">
   <p:cSld>
     <p:spTree>
@@ -20828,7 +22447,7 @@
 </p:sld>
 </file>
 
-<file path=ppt/slides/slide5.xml><?xml version="1.0" encoding="utf-8"?>
+<file path=ppt/slides/slide6.xml><?xml version="1.0" encoding="utf-8"?>
 <p:sld xmlns:a="http://schemas.openxmlformats.org/drawingml/2006/main" xmlns:r="http://schemas.openxmlformats.org/officeDocument/2006/relationships" xmlns:p="http://schemas.openxmlformats.org/presentationml/2006/main">
   <p:cSld>
     <p:spTree>
@@ -21334,7 +22953,7 @@
 </p:sld>
 </file>
 
-<file path=ppt/slides/slide6.xml><?xml version="1.0" encoding="utf-8"?>
+<file path=ppt/slides/slide7.xml><?xml version="1.0" encoding="utf-8"?>
 <p:sld xmlns:a="http://schemas.openxmlformats.org/drawingml/2006/main" xmlns:r="http://schemas.openxmlformats.org/officeDocument/2006/relationships" xmlns:p="http://schemas.openxmlformats.org/presentationml/2006/main">
   <p:cSld>
     <p:spTree>
@@ -21861,7 +23480,7 @@
 </p:sld>
 </file>
 
-<file path=ppt/slides/slide7.xml><?xml version="1.0" encoding="utf-8"?>
+<file path=ppt/slides/slide8.xml><?xml version="1.0" encoding="utf-8"?>
 <p:sld xmlns:a="http://schemas.openxmlformats.org/drawingml/2006/main" xmlns:r="http://schemas.openxmlformats.org/officeDocument/2006/relationships" xmlns:p="http://schemas.openxmlformats.org/presentationml/2006/main">
   <p:cSld>
     <p:spTree>

</xml_diff>